<commit_message>
Oscar predictions on pptx
</commit_message>
<xml_diff>
--- a/INDICADORES_MACROECONOMICOS/José/Presentación.pptx
+++ b/INDICADORES_MACROECONOMICOS/José/Presentación.pptx
@@ -17,6 +17,11 @@
     <p:sldId id="265" r:id="rId11"/>
     <p:sldId id="266" r:id="rId12"/>
     <p:sldId id="267" r:id="rId13"/>
+    <p:sldId id="268" r:id="rId14"/>
+    <p:sldId id="269" r:id="rId15"/>
+    <p:sldId id="270" r:id="rId16"/>
+    <p:sldId id="271" r:id="rId17"/>
+    <p:sldId id="272" r:id="rId18"/>
   </p:sldIdLst>
   <p:sldSz cx="9144000" cy="6858000" type="screen4x3"/>
   <p:notesSz cx="6858000" cy="9144000"/>
@@ -3230,7 +3235,7 @@
             </a:pPr>
             <a:r>
               <a:rPr/>
-              <a:t>ENOE</a:t>
+              <a:t>INPC</a:t>
             </a:r>
           </a:p>
         </p:txBody>
@@ -3255,7 +3260,7 @@
             </a:pPr>
             <a:r>
               <a:rPr/>
-              <a:t>Introducción Encuesta Nacional de ocupación y empleo</a:t>
+              <a:t>Vamos a analizar el INPC (Indice Nacional de Precios al Consumidor). Primero hay que definir que es el índice de precios al consumidor o índice de precios de consumo(comúnmente llamado por su sigla IPC) ; es un índice económico en el que se valoran los precios de un determinado conjunto de bienes y servicios.</a:t>
             </a:r>
           </a:p>
         </p:txBody>
@@ -3302,7 +3307,7 @@
             </a:pPr>
             <a:r>
               <a:rPr/>
-              <a:t>Slide</a:t>
+              <a:t>Gráficas</a:t>
             </a:r>
             <a:r>
               <a:rPr/>
@@ -3310,80 +3315,41 @@
             </a:r>
             <a:r>
               <a:rPr/>
-              <a:t>with</a:t>
-            </a:r>
-            <a:r>
-              <a:rPr/>
-              <a:t> </a:t>
-            </a:r>
-            <a:r>
-              <a:rPr/>
-              <a:t>R</a:t>
-            </a:r>
-            <a:r>
-              <a:rPr/>
-              <a:t> </a:t>
-            </a:r>
-            <a:r>
-              <a:rPr/>
-              <a:t>Output</a:t>
-            </a:r>
-          </a:p>
-        </p:txBody>
-      </p:sp>
-      <p:sp>
-        <p:nvSpPr>
-          <p:cNvPr id="3" name="Content Placeholder 2"/>
-          <p:cNvSpPr>
-            <a:spLocks noGrp="1"/>
-          </p:cNvSpPr>
-          <p:nvPr>
-            <p:ph idx="1"/>
-          </p:nvPr>
-        </p:nvSpPr>
-        <p:spPr/>
-        <p:txBody>
-          <a:bodyPr/>
-          <a:lstStyle/>
-          <a:p>
-            <a:pPr lvl="0" indent="0">
-              <a:buNone/>
-            </a:pPr>
-            <a:r>
-              <a:rPr>
-                <a:solidFill>
-                  <a:srgbClr val="06287E"/>
-                </a:solidFill>
-                <a:latin typeface="Courier"/>
-              </a:rPr>
-              <a:t>summary</a:t>
-            </a:r>
-            <a:r>
-              <a:rPr>
-                <a:latin typeface="Courier"/>
-              </a:rPr>
-              <a:t>(cars)</a:t>
-            </a:r>
-          </a:p>
-          <a:p>
-            <a:pPr lvl="0" indent="0">
-              <a:buNone/>
-            </a:pPr>
-            <a:r>
-              <a:rPr>
-                <a:latin typeface="Courier"/>
-              </a:rPr>
-              <a:t>##      speed           dist       
-##  Min.   : 4.0   Min.   :  2.00  
-##  1st Qu.:12.0   1st Qu.: 26.00  
-##  Median :15.0   Median : 36.00  
-##  Mean   :15.4   Mean   : 42.98  
-##  3rd Qu.:19.0   3rd Qu.: 56.00  
-##  Max.   :25.0   Max.   :120.00</a:t>
-            </a:r>
-          </a:p>
-        </p:txBody>
-      </p:sp>
+              <a:t>INPC</a:t>
+            </a:r>
+          </a:p>
+        </p:txBody>
+      </p:sp>
+      <p:pic>
+        <p:nvPicPr>
+          <p:cNvPr descr="Presentación_files/figure-pptx/unnamed-chunk-9-1.png" id="0" name="Picture 1"/>
+          <p:cNvPicPr>
+            <a:picLocks noGrp="1" noChangeAspect="1"/>
+          </p:cNvPicPr>
+          <p:nvPr/>
+        </p:nvPicPr>
+        <p:blipFill>
+          <a:blip r:embed="rId2"/>
+          <a:stretch>
+            <a:fillRect/>
+          </a:stretch>
+        </p:blipFill>
+        <p:spPr bwMode="auto">
+          <a:xfrm>
+            <a:off x="1752600" y="1600200"/>
+            <a:ext cx="5651500" cy="4521200"/>
+          </a:xfrm>
+          <a:prstGeom prst="rect">
+            <a:avLst/>
+          </a:prstGeom>
+          <a:noFill/>
+          <a:ln w="9525">
+            <a:noFill/>
+            <a:headEnd/>
+            <a:tailEnd/>
+          </a:ln>
+        </p:spPr>
+      </p:pic>
     </p:spTree>
   </p:cSld>
 </p:sld>
@@ -3426,7 +3392,79 @@
             </a:pPr>
             <a:r>
               <a:rPr/>
-              <a:t>Slide</a:t>
+              <a:t>IED</a:t>
+            </a:r>
+          </a:p>
+        </p:txBody>
+      </p:sp>
+      <p:sp>
+        <p:nvSpPr>
+          <p:cNvPr id="3" name="Content Placeholder 2"/>
+          <p:cNvSpPr>
+            <a:spLocks noGrp="1"/>
+          </p:cNvSpPr>
+          <p:nvPr>
+            <p:ph idx="1"/>
+          </p:nvPr>
+        </p:nvSpPr>
+        <p:spPr/>
+        <p:txBody>
+          <a:bodyPr/>
+          <a:lstStyle/>
+          <a:p>
+            <a:pPr lvl="0" marL="0" indent="0">
+              <a:buNone/>
+            </a:pPr>
+            <a:r>
+              <a:rPr/>
+              <a:t>La Inversión Extranjera Directa (IED) es aquella que tiene como propósito crear un vínculo duradero con fines económicos y empresariales de largo plazo, por parte de un inversionista extranjero en el país receptor.</a:t>
+            </a:r>
+          </a:p>
+        </p:txBody>
+      </p:sp>
+    </p:spTree>
+  </p:cSld>
+</p:sld>
+</file>
+
+<file path=ppt/slides/slide13.xml><?xml version="1.0" encoding="utf-8"?>
+<p:sld xmlns:a="http://schemas.openxmlformats.org/drawingml/2006/main" xmlns:r="http://schemas.openxmlformats.org/officeDocument/2006/relationships" xmlns:p="http://schemas.openxmlformats.org/presentationml/2006/main">
+  <p:cSld>
+    <p:spTree>
+      <p:nvGrpSpPr>
+        <p:cNvPr id="1" name=""/>
+        <p:cNvGrpSpPr/>
+        <p:nvPr/>
+      </p:nvGrpSpPr>
+      <p:grpSpPr>
+        <a:xfrm>
+          <a:off x="0" y="0"/>
+          <a:ext cx="0" cy="0"/>
+          <a:chOff x="0" y="0"/>
+          <a:chExt cx="0" cy="0"/>
+        </a:xfrm>
+      </p:grpSpPr>
+      <p:sp>
+        <p:nvSpPr>
+          <p:cNvPr id="2" name="Title 1"/>
+          <p:cNvSpPr>
+            <a:spLocks noGrp="1"/>
+          </p:cNvSpPr>
+          <p:nvPr>
+            <p:ph type="title"/>
+          </p:nvPr>
+        </p:nvSpPr>
+        <p:spPr/>
+        <p:txBody>
+          <a:bodyPr/>
+          <a:lstStyle/>
+          <a:p>
+            <a:pPr lvl="0" marL="0" indent="0">
+              <a:buNone/>
+            </a:pPr>
+            <a:r>
+              <a:rPr/>
+              <a:t>Gráfica</a:t>
             </a:r>
             <a:r>
               <a:rPr/>
@@ -3434,22 +3472,328 @@
             </a:r>
             <a:r>
               <a:rPr/>
-              <a:t>with</a:t>
-            </a:r>
-            <a:r>
-              <a:rPr/>
-              <a:t> </a:t>
-            </a:r>
-            <a:r>
-              <a:rPr/>
-              <a:t>Plot</a:t>
+              <a:t>IED</a:t>
             </a:r>
           </a:p>
         </p:txBody>
       </p:sp>
       <p:pic>
         <p:nvPicPr>
-          <p:cNvPr descr="Presentación_files/figure-pptx/pressure-1.png" id="0" name="Picture 1"/>
+          <p:cNvPr descr="Presentación_files/figure-pptx/unnamed-chunk-10-1.png" id="0" name="Picture 1"/>
+          <p:cNvPicPr>
+            <a:picLocks noGrp="1" noChangeAspect="1"/>
+          </p:cNvPicPr>
+          <p:nvPr/>
+        </p:nvPicPr>
+        <p:blipFill>
+          <a:blip r:embed="rId2"/>
+          <a:stretch>
+            <a:fillRect/>
+          </a:stretch>
+        </p:blipFill>
+        <p:spPr bwMode="auto">
+          <a:xfrm>
+            <a:off x="1752600" y="1600200"/>
+            <a:ext cx="5651500" cy="4521200"/>
+          </a:xfrm>
+          <a:prstGeom prst="rect">
+            <a:avLst/>
+          </a:prstGeom>
+          <a:noFill/>
+          <a:ln w="9525">
+            <a:noFill/>
+            <a:headEnd/>
+            <a:tailEnd/>
+          </a:ln>
+        </p:spPr>
+      </p:pic>
+    </p:spTree>
+  </p:cSld>
+</p:sld>
+</file>
+
+<file path=ppt/slides/slide14.xml><?xml version="1.0" encoding="utf-8"?>
+<p:sld xmlns:a="http://schemas.openxmlformats.org/drawingml/2006/main" xmlns:r="http://schemas.openxmlformats.org/officeDocument/2006/relationships" xmlns:p="http://schemas.openxmlformats.org/presentationml/2006/main">
+  <p:cSld>
+    <p:spTree>
+      <p:nvGrpSpPr>
+        <p:cNvPr id="1" name=""/>
+        <p:cNvGrpSpPr/>
+        <p:nvPr/>
+      </p:nvGrpSpPr>
+      <p:grpSpPr>
+        <a:xfrm>
+          <a:off x="0" y="0"/>
+          <a:ext cx="0" cy="0"/>
+          <a:chOff x="0" y="0"/>
+          <a:chExt cx="0" cy="0"/>
+        </a:xfrm>
+      </p:grpSpPr>
+      <p:sp>
+        <p:nvSpPr>
+          <p:cNvPr id="2" name="Title 1"/>
+          <p:cNvSpPr>
+            <a:spLocks noGrp="1"/>
+          </p:cNvSpPr>
+          <p:nvPr>
+            <p:ph type="title"/>
+          </p:nvPr>
+        </p:nvSpPr>
+        <p:spPr/>
+        <p:txBody>
+          <a:bodyPr/>
+          <a:lstStyle/>
+          <a:p>
+            <a:pPr lvl="0" marL="0" indent="0">
+              <a:buNone/>
+            </a:pPr>
+            <a:r>
+              <a:rPr/>
+              <a:t>ENOE</a:t>
+            </a:r>
+          </a:p>
+        </p:txBody>
+      </p:sp>
+      <p:sp>
+        <p:nvSpPr>
+          <p:cNvPr id="3" name="Content Placeholder 2"/>
+          <p:cNvSpPr>
+            <a:spLocks noGrp="1"/>
+          </p:cNvSpPr>
+          <p:nvPr>
+            <p:ph idx="1"/>
+          </p:nvPr>
+        </p:nvSpPr>
+        <p:spPr/>
+        <p:txBody>
+          <a:bodyPr/>
+          <a:lstStyle/>
+          <a:p>
+            <a:pPr lvl="0" marL="0" indent="0">
+              <a:buNone/>
+            </a:pPr>
+            <a:r>
+              <a:rPr/>
+              <a:t>Introducción Encuesta Nacional de ocupación y empleo</a:t>
+            </a:r>
+          </a:p>
+        </p:txBody>
+      </p:sp>
+    </p:spTree>
+  </p:cSld>
+</p:sld>
+</file>
+
+<file path=ppt/slides/slide15.xml><?xml version="1.0" encoding="utf-8"?>
+<p:sld xmlns:a="http://schemas.openxmlformats.org/drawingml/2006/main" xmlns:r="http://schemas.openxmlformats.org/officeDocument/2006/relationships" xmlns:p="http://schemas.openxmlformats.org/presentationml/2006/main">
+  <p:cSld>
+    <p:spTree>
+      <p:nvGrpSpPr>
+        <p:cNvPr id="1" name=""/>
+        <p:cNvGrpSpPr/>
+        <p:nvPr/>
+      </p:nvGrpSpPr>
+      <p:grpSpPr>
+        <a:xfrm>
+          <a:off x="0" y="0"/>
+          <a:ext cx="0" cy="0"/>
+          <a:chOff x="0" y="0"/>
+          <a:chExt cx="0" cy="0"/>
+        </a:xfrm>
+      </p:grpSpPr>
+      <p:sp>
+        <p:nvSpPr>
+          <p:cNvPr id="2" name="Title 1"/>
+          <p:cNvSpPr>
+            <a:spLocks noGrp="1"/>
+          </p:cNvSpPr>
+          <p:nvPr>
+            <p:ph type="title"/>
+          </p:nvPr>
+        </p:nvSpPr>
+        <p:spPr/>
+        <p:txBody>
+          <a:bodyPr/>
+          <a:lstStyle/>
+          <a:p>
+            <a:pPr lvl="0" marL="0" indent="0">
+              <a:buNone/>
+            </a:pPr>
+            <a:r>
+              <a:rPr/>
+              <a:t>IMSS</a:t>
+            </a:r>
+          </a:p>
+        </p:txBody>
+      </p:sp>
+      <p:sp>
+        <p:nvSpPr>
+          <p:cNvPr id="3" name="Content Placeholder 2"/>
+          <p:cNvSpPr>
+            <a:spLocks noGrp="1"/>
+          </p:cNvSpPr>
+          <p:nvPr>
+            <p:ph idx="1"/>
+          </p:nvPr>
+        </p:nvSpPr>
+        <p:spPr/>
+        <p:txBody>
+          <a:bodyPr/>
+          <a:lstStyle/>
+          <a:p>
+            <a:pPr lvl="0" marL="0" indent="0">
+              <a:buNone/>
+            </a:pPr>
+            <a:r>
+              <a:rPr/>
+              <a:t>Asegurados o cotizantes : Se refiere a las personas que están aseguradas en el IMSS de manera directa como titulares. Incluye todas las modalidades de aseguramiento, tanto las relacionadas con puestos de trabajo afiliados al IMSS, como las afiliaciones de asegurados sin un empleo asociado en las modalidades 32, 33 y 40. No considera a pensionados o jubilados, ni a los beneficiarios de asegurados, pensionados o jubilados.</a:t>
+            </a:r>
+          </a:p>
+        </p:txBody>
+      </p:sp>
+    </p:spTree>
+  </p:cSld>
+</p:sld>
+</file>
+
+<file path=ppt/slides/slide16.xml><?xml version="1.0" encoding="utf-8"?>
+<p:sld xmlns:a="http://schemas.openxmlformats.org/drawingml/2006/main" xmlns:r="http://schemas.openxmlformats.org/officeDocument/2006/relationships" xmlns:p="http://schemas.openxmlformats.org/presentationml/2006/main">
+  <p:cSld>
+    <p:spTree>
+      <p:nvGrpSpPr>
+        <p:cNvPr id="1" name=""/>
+        <p:cNvGrpSpPr/>
+        <p:nvPr/>
+      </p:nvGrpSpPr>
+      <p:grpSpPr>
+        <a:xfrm>
+          <a:off x="0" y="0"/>
+          <a:ext cx="0" cy="0"/>
+          <a:chOff x="0" y="0"/>
+          <a:chExt cx="0" cy="0"/>
+        </a:xfrm>
+      </p:grpSpPr>
+      <p:sp>
+        <p:nvSpPr>
+          <p:cNvPr id="2" name="Title 1"/>
+          <p:cNvSpPr>
+            <a:spLocks noGrp="1"/>
+          </p:cNvSpPr>
+          <p:nvPr>
+            <p:ph type="title"/>
+          </p:nvPr>
+        </p:nvSpPr>
+        <p:spPr/>
+        <p:txBody>
+          <a:bodyPr/>
+          <a:lstStyle/>
+          <a:p>
+            <a:pPr lvl="0" marL="0" indent="0">
+              <a:buNone/>
+            </a:pPr>
+            <a:r>
+              <a:rPr/>
+              <a:t>Gráfica</a:t>
+            </a:r>
+            <a:r>
+              <a:rPr/>
+              <a:t> </a:t>
+            </a:r>
+            <a:r>
+              <a:rPr/>
+              <a:t>de</a:t>
+            </a:r>
+            <a:r>
+              <a:rPr/>
+              <a:t> </a:t>
+            </a:r>
+            <a:r>
+              <a:rPr/>
+              <a:t>IMSS</a:t>
+            </a:r>
+          </a:p>
+        </p:txBody>
+      </p:sp>
+      <p:pic>
+        <p:nvPicPr>
+          <p:cNvPr descr="Presentación_files/figure-pptx/unnamed-chunk-11-1.png" id="0" name="Picture 1"/>
+          <p:cNvPicPr>
+            <a:picLocks noGrp="1" noChangeAspect="1"/>
+          </p:cNvPicPr>
+          <p:nvPr/>
+        </p:nvPicPr>
+        <p:blipFill>
+          <a:blip r:embed="rId2"/>
+          <a:stretch>
+            <a:fillRect/>
+          </a:stretch>
+        </p:blipFill>
+        <p:spPr bwMode="auto">
+          <a:xfrm>
+            <a:off x="1752600" y="1600200"/>
+            <a:ext cx="5651500" cy="4521200"/>
+          </a:xfrm>
+          <a:prstGeom prst="rect">
+            <a:avLst/>
+          </a:prstGeom>
+          <a:noFill/>
+          <a:ln w="9525">
+            <a:noFill/>
+            <a:headEnd/>
+            <a:tailEnd/>
+          </a:ln>
+        </p:spPr>
+      </p:pic>
+    </p:spTree>
+  </p:cSld>
+</p:sld>
+</file>
+
+<file path=ppt/slides/slide17.xml><?xml version="1.0" encoding="utf-8"?>
+<p:sld xmlns:a="http://schemas.openxmlformats.org/drawingml/2006/main" xmlns:r="http://schemas.openxmlformats.org/officeDocument/2006/relationships" xmlns:p="http://schemas.openxmlformats.org/presentationml/2006/main">
+  <p:cSld>
+    <p:spTree>
+      <p:nvGrpSpPr>
+        <p:cNvPr id="1" name=""/>
+        <p:cNvGrpSpPr/>
+        <p:nvPr/>
+      </p:nvGrpSpPr>
+      <p:grpSpPr>
+        <a:xfrm>
+          <a:off x="0" y="0"/>
+          <a:ext cx="0" cy="0"/>
+          <a:chOff x="0" y="0"/>
+          <a:chExt cx="0" cy="0"/>
+        </a:xfrm>
+      </p:grpSpPr>
+      <p:sp>
+        <p:nvSpPr>
+          <p:cNvPr id="2" name="Title 1"/>
+          <p:cNvSpPr>
+            <a:spLocks noGrp="1"/>
+          </p:cNvSpPr>
+          <p:nvPr>
+            <p:ph type="title"/>
+          </p:nvPr>
+        </p:nvSpPr>
+        <p:spPr/>
+        <p:txBody>
+          <a:bodyPr/>
+          <a:lstStyle/>
+          <a:p>
+            <a:pPr lvl="0" marL="0" indent="0">
+              <a:buNone/>
+            </a:pPr>
+            <a:r>
+              <a:rPr/>
+              <a:t>Predicción</a:t>
+            </a:r>
+          </a:p>
+        </p:txBody>
+      </p:sp>
+      <p:pic>
+        <p:nvPicPr>
+          <p:cNvPr descr="Presentación_files/figure-pptx/unnamed-chunk-12-1.png" id="0" name="Picture 1"/>
           <p:cNvPicPr>
             <a:picLocks noGrp="1" noChangeAspect="1"/>
           </p:cNvPicPr>
@@ -3879,7 +4223,7 @@
             </a:pPr>
             <a:r>
               <a:rPr/>
-              <a:t>INPC</a:t>
+              <a:t>Visitantes</a:t>
             </a:r>
           </a:p>
         </p:txBody>
@@ -3904,7 +4248,7 @@
             </a:pPr>
             <a:r>
               <a:rPr/>
-              <a:t>Vamos a analizar el INPC (Indice Nacional de Precios al Consumidor). Primero hay que definir que es el índice de precios al consumidor o índice de precios de consumo(comúnmente llamado por su sigla IPC) ; es un índice económico en el que se valoran los precios de un determinado conjunto de bienes y servicios.</a:t>
+              <a:t>Analizaremos la cantidad de Visitantes extranjeros por entrada aérea, por nacionalidad en algunos de los aeropuertos de nuestro país, esto con la intención de ver como el turismo se va manejando a tráves de los años y de esta manera poder también relacionarlo con otros indicadores macroeconomicos</a:t>
             </a:r>
           </a:p>
         </p:txBody>
@@ -3959,14 +4303,22 @@
             </a:r>
             <a:r>
               <a:rPr/>
-              <a:t>INPC</a:t>
+              <a:t>sobre</a:t>
+            </a:r>
+            <a:r>
+              <a:rPr/>
+              <a:t> </a:t>
+            </a:r>
+            <a:r>
+              <a:rPr/>
+              <a:t>visitantes</a:t>
             </a:r>
           </a:p>
         </p:txBody>
       </p:sp>
       <p:pic>
         <p:nvPicPr>
-          <p:cNvPr descr="Presentación_files/figure-pptx/unnamed-chunk-5-1.png" id="0" name="Picture 1"/>
+          <p:cNvPr descr="Presentación_files/figure-pptx/unnamed-chunk-4-1.png" id="0" name="Picture 1"/>
           <p:cNvPicPr>
             <a:picLocks noGrp="1" noChangeAspect="1"/>
           </p:cNvPicPr>
@@ -4036,36 +4388,57 @@
             </a:pPr>
             <a:r>
               <a:rPr/>
-              <a:t>IED</a:t>
-            </a:r>
-          </a:p>
-        </p:txBody>
-      </p:sp>
-      <p:sp>
-        <p:nvSpPr>
-          <p:cNvPr id="3" name="Content Placeholder 2"/>
-          <p:cNvSpPr>
-            <a:spLocks noGrp="1"/>
-          </p:cNvSpPr>
-          <p:nvPr>
-            <p:ph idx="1"/>
-          </p:nvPr>
-        </p:nvSpPr>
-        <p:spPr/>
-        <p:txBody>
-          <a:bodyPr/>
-          <a:lstStyle/>
-          <a:p>
-            <a:pPr lvl="0" marL="0" indent="0">
-              <a:buNone/>
-            </a:pPr>
-            <a:r>
-              <a:rPr/>
-              <a:t>La Inversión Extranjera Directa (IED) es aquella que tiene como propósito crear un vínculo duradero con fines económicos y empresariales de largo plazo, por parte de un inversionista extranjero en el país receptor.</a:t>
-            </a:r>
-          </a:p>
-        </p:txBody>
-      </p:sp>
+              <a:t>Comportamiento</a:t>
+            </a:r>
+            <a:r>
+              <a:rPr/>
+              <a:t> </a:t>
+            </a:r>
+            <a:r>
+              <a:rPr/>
+              <a:t>de</a:t>
+            </a:r>
+            <a:r>
+              <a:rPr/>
+              <a:t> </a:t>
+            </a:r>
+            <a:r>
+              <a:rPr/>
+              <a:t>visitantes</a:t>
+            </a:r>
+          </a:p>
+        </p:txBody>
+      </p:sp>
+      <p:pic>
+        <p:nvPicPr>
+          <p:cNvPr descr="Presentación_files/figure-pptx/unnamed-chunk-5-1.png" id="0" name="Picture 1"/>
+          <p:cNvPicPr>
+            <a:picLocks noGrp="1" noChangeAspect="1"/>
+          </p:cNvPicPr>
+          <p:nvPr/>
+        </p:nvPicPr>
+        <p:blipFill>
+          <a:blip r:embed="rId2"/>
+          <a:stretch>
+            <a:fillRect/>
+          </a:stretch>
+        </p:blipFill>
+        <p:spPr bwMode="auto">
+          <a:xfrm>
+            <a:off x="1752600" y="1600200"/>
+            <a:ext cx="5651500" cy="4521200"/>
+          </a:xfrm>
+          <a:prstGeom prst="rect">
+            <a:avLst/>
+          </a:prstGeom>
+          <a:noFill/>
+          <a:ln w="9525">
+            <a:noFill/>
+            <a:headEnd/>
+            <a:tailEnd/>
+          </a:ln>
+        </p:spPr>
+      </p:pic>
     </p:spTree>
   </p:cSld>
 </p:sld>
@@ -4108,15 +4481,7 @@
             </a:pPr>
             <a:r>
               <a:rPr/>
-              <a:t>Gráfica</a:t>
-            </a:r>
-            <a:r>
-              <a:rPr/>
-              <a:t> </a:t>
-            </a:r>
-            <a:r>
-              <a:rPr/>
-              <a:t>IED</a:t>
+              <a:t>Predicción</a:t>
             </a:r>
           </a:p>
         </p:txBody>

</xml_diff>

<commit_message>
Presentation 17/04/2021: team's Power point presentation, Marta's Power point presentation and Dashboard with predictions
</commit_message>
<xml_diff>
--- a/INDICADORES_MACROECONOMICOS/José/Presentación.pptx
+++ b/INDICADORES_MACROECONOMICOS/José/Presentación.pptx
@@ -20,8 +20,6 @@
     <p:sldId id="268" r:id="rId14"/>
     <p:sldId id="269" r:id="rId15"/>
     <p:sldId id="270" r:id="rId16"/>
-    <p:sldId id="271" r:id="rId17"/>
-    <p:sldId id="272" r:id="rId18"/>
   </p:sldIdLst>
   <p:sldSz cx="9144000" cy="6858000" type="screen4x3"/>
   <p:notesSz cx="6858000" cy="9144000"/>
@@ -3235,7 +3233,7 @@
             </a:pPr>
             <a:r>
               <a:rPr/>
-              <a:t>INPC</a:t>
+              <a:t>IED</a:t>
             </a:r>
           </a:p>
         </p:txBody>
@@ -3260,7 +3258,7 @@
             </a:pPr>
             <a:r>
               <a:rPr/>
-              <a:t>Vamos a analizar el INPC (Indice Nacional de Precios al Consumidor). Primero hay que definir que es el índice de precios al consumidor o índice de precios de consumo(comúnmente llamado por su sigla IPC) ; es un índice económico en el que se valoran los precios de un determinado conjunto de bienes y servicios.</a:t>
+              <a:t>La Inversión Extranjera Directa (IED) es aquella que tiene como propósito crear un vínculo duradero con fines económicos y empresariales de largo plazo, por parte de un inversionista extranjero en el país receptor.</a:t>
             </a:r>
           </a:p>
         </p:txBody>
@@ -3307,7 +3305,7 @@
             </a:pPr>
             <a:r>
               <a:rPr/>
-              <a:t>Gráficas</a:t>
+              <a:t>Gráfica</a:t>
             </a:r>
             <a:r>
               <a:rPr/>
@@ -3315,7 +3313,7 @@
             </a:r>
             <a:r>
               <a:rPr/>
-              <a:t>INPC</a:t>
+              <a:t>IED</a:t>
             </a:r>
           </a:p>
         </p:txBody>
@@ -3392,7 +3390,7 @@
             </a:pPr>
             <a:r>
               <a:rPr/>
-              <a:t>IED</a:t>
+              <a:t>ENOE</a:t>
             </a:r>
           </a:p>
         </p:txBody>
@@ -3417,7 +3415,7 @@
             </a:pPr>
             <a:r>
               <a:rPr/>
-              <a:t>La Inversión Extranjera Directa (IED) es aquella que tiene como propósito crear un vínculo duradero con fines económicos y empresariales de largo plazo, por parte de un inversionista extranjero en el país receptor.</a:t>
+              <a:t>Introducción Encuesta Nacional de ocupación y empleo</a:t>
             </a:r>
           </a:p>
         </p:txBody>
@@ -3464,6 +3462,78 @@
             </a:pPr>
             <a:r>
               <a:rPr/>
+              <a:t>IMSS</a:t>
+            </a:r>
+          </a:p>
+        </p:txBody>
+      </p:sp>
+      <p:sp>
+        <p:nvSpPr>
+          <p:cNvPr id="3" name="Content Placeholder 2"/>
+          <p:cNvSpPr>
+            <a:spLocks noGrp="1"/>
+          </p:cNvSpPr>
+          <p:nvPr>
+            <p:ph idx="1"/>
+          </p:nvPr>
+        </p:nvSpPr>
+        <p:spPr/>
+        <p:txBody>
+          <a:bodyPr/>
+          <a:lstStyle/>
+          <a:p>
+            <a:pPr lvl="0" marL="0" indent="0">
+              <a:buNone/>
+            </a:pPr>
+            <a:r>
+              <a:rPr/>
+              <a:t>Asegurados o cotizantes : Se refiere a las personas que están aseguradas en el IMSS de manera directa como titulares. Incluye todas las modalidades de aseguramiento, tanto las relacionadas con puestos de trabajo afiliados al IMSS, como las afiliaciones de asegurados sin un empleo asociado en las modalidades 32, 33 y 40. No considera a pensionados o jubilados, ni a los beneficiarios de asegurados, pensionados o jubilados.</a:t>
+            </a:r>
+          </a:p>
+        </p:txBody>
+      </p:sp>
+    </p:spTree>
+  </p:cSld>
+</p:sld>
+</file>
+
+<file path=ppt/slides/slide14.xml><?xml version="1.0" encoding="utf-8"?>
+<p:sld xmlns:a="http://schemas.openxmlformats.org/drawingml/2006/main" xmlns:r="http://schemas.openxmlformats.org/officeDocument/2006/relationships" xmlns:p="http://schemas.openxmlformats.org/presentationml/2006/main">
+  <p:cSld>
+    <p:spTree>
+      <p:nvGrpSpPr>
+        <p:cNvPr id="1" name=""/>
+        <p:cNvGrpSpPr/>
+        <p:nvPr/>
+      </p:nvGrpSpPr>
+      <p:grpSpPr>
+        <a:xfrm>
+          <a:off x="0" y="0"/>
+          <a:ext cx="0" cy="0"/>
+          <a:chOff x="0" y="0"/>
+          <a:chExt cx="0" cy="0"/>
+        </a:xfrm>
+      </p:grpSpPr>
+      <p:sp>
+        <p:nvSpPr>
+          <p:cNvPr id="2" name="Title 1"/>
+          <p:cNvSpPr>
+            <a:spLocks noGrp="1"/>
+          </p:cNvSpPr>
+          <p:nvPr>
+            <p:ph type="title"/>
+          </p:nvPr>
+        </p:nvSpPr>
+        <p:spPr/>
+        <p:txBody>
+          <a:bodyPr/>
+          <a:lstStyle/>
+          <a:p>
+            <a:pPr lvl="0" marL="0" indent="0">
+              <a:buNone/>
+            </a:pPr>
+            <a:r>
+              <a:rPr/>
               <a:t>Gráfica</a:t>
             </a:r>
             <a:r>
@@ -3472,7 +3542,15 @@
             </a:r>
             <a:r>
               <a:rPr/>
-              <a:t>IED</a:t>
+              <a:t>de</a:t>
+            </a:r>
+            <a:r>
+              <a:rPr/>
+              <a:t> </a:t>
+            </a:r>
+            <a:r>
+              <a:rPr/>
+              <a:t>IMSS</a:t>
             </a:r>
           </a:p>
         </p:txBody>
@@ -3512,78 +3590,6 @@
 </p:sld>
 </file>
 
-<file path=ppt/slides/slide14.xml><?xml version="1.0" encoding="utf-8"?>
-<p:sld xmlns:a="http://schemas.openxmlformats.org/drawingml/2006/main" xmlns:r="http://schemas.openxmlformats.org/officeDocument/2006/relationships" xmlns:p="http://schemas.openxmlformats.org/presentationml/2006/main">
-  <p:cSld>
-    <p:spTree>
-      <p:nvGrpSpPr>
-        <p:cNvPr id="1" name=""/>
-        <p:cNvGrpSpPr/>
-        <p:nvPr/>
-      </p:nvGrpSpPr>
-      <p:grpSpPr>
-        <a:xfrm>
-          <a:off x="0" y="0"/>
-          <a:ext cx="0" cy="0"/>
-          <a:chOff x="0" y="0"/>
-          <a:chExt cx="0" cy="0"/>
-        </a:xfrm>
-      </p:grpSpPr>
-      <p:sp>
-        <p:nvSpPr>
-          <p:cNvPr id="2" name="Title 1"/>
-          <p:cNvSpPr>
-            <a:spLocks noGrp="1"/>
-          </p:cNvSpPr>
-          <p:nvPr>
-            <p:ph type="title"/>
-          </p:nvPr>
-        </p:nvSpPr>
-        <p:spPr/>
-        <p:txBody>
-          <a:bodyPr/>
-          <a:lstStyle/>
-          <a:p>
-            <a:pPr lvl="0" marL="0" indent="0">
-              <a:buNone/>
-            </a:pPr>
-            <a:r>
-              <a:rPr/>
-              <a:t>ENOE</a:t>
-            </a:r>
-          </a:p>
-        </p:txBody>
-      </p:sp>
-      <p:sp>
-        <p:nvSpPr>
-          <p:cNvPr id="3" name="Content Placeholder 2"/>
-          <p:cNvSpPr>
-            <a:spLocks noGrp="1"/>
-          </p:cNvSpPr>
-          <p:nvPr>
-            <p:ph idx="1"/>
-          </p:nvPr>
-        </p:nvSpPr>
-        <p:spPr/>
-        <p:txBody>
-          <a:bodyPr/>
-          <a:lstStyle/>
-          <a:p>
-            <a:pPr lvl="0" marL="0" indent="0">
-              <a:buNone/>
-            </a:pPr>
-            <a:r>
-              <a:rPr/>
-              <a:t>Introducción Encuesta Nacional de ocupación y empleo</a:t>
-            </a:r>
-          </a:p>
-        </p:txBody>
-      </p:sp>
-    </p:spTree>
-  </p:cSld>
-</p:sld>
-</file>
-
 <file path=ppt/slides/slide15.xml><?xml version="1.0" encoding="utf-8"?>
 <p:sld xmlns:a="http://schemas.openxmlformats.org/drawingml/2006/main" xmlns:r="http://schemas.openxmlformats.org/officeDocument/2006/relationships" xmlns:p="http://schemas.openxmlformats.org/presentationml/2006/main">
   <p:cSld>
@@ -3621,95 +3627,7 @@
             </a:pPr>
             <a:r>
               <a:rPr/>
-              <a:t>IMSS</a:t>
-            </a:r>
-          </a:p>
-        </p:txBody>
-      </p:sp>
-      <p:sp>
-        <p:nvSpPr>
-          <p:cNvPr id="3" name="Content Placeholder 2"/>
-          <p:cNvSpPr>
-            <a:spLocks noGrp="1"/>
-          </p:cNvSpPr>
-          <p:nvPr>
-            <p:ph idx="1"/>
-          </p:nvPr>
-        </p:nvSpPr>
-        <p:spPr/>
-        <p:txBody>
-          <a:bodyPr/>
-          <a:lstStyle/>
-          <a:p>
-            <a:pPr lvl="0" marL="0" indent="0">
-              <a:buNone/>
-            </a:pPr>
-            <a:r>
-              <a:rPr/>
-              <a:t>Asegurados o cotizantes : Se refiere a las personas que están aseguradas en el IMSS de manera directa como titulares. Incluye todas las modalidades de aseguramiento, tanto las relacionadas con puestos de trabajo afiliados al IMSS, como las afiliaciones de asegurados sin un empleo asociado en las modalidades 32, 33 y 40. No considera a pensionados o jubilados, ni a los beneficiarios de asegurados, pensionados o jubilados.</a:t>
-            </a:r>
-          </a:p>
-        </p:txBody>
-      </p:sp>
-    </p:spTree>
-  </p:cSld>
-</p:sld>
-</file>
-
-<file path=ppt/slides/slide16.xml><?xml version="1.0" encoding="utf-8"?>
-<p:sld xmlns:a="http://schemas.openxmlformats.org/drawingml/2006/main" xmlns:r="http://schemas.openxmlformats.org/officeDocument/2006/relationships" xmlns:p="http://schemas.openxmlformats.org/presentationml/2006/main">
-  <p:cSld>
-    <p:spTree>
-      <p:nvGrpSpPr>
-        <p:cNvPr id="1" name=""/>
-        <p:cNvGrpSpPr/>
-        <p:nvPr/>
-      </p:nvGrpSpPr>
-      <p:grpSpPr>
-        <a:xfrm>
-          <a:off x="0" y="0"/>
-          <a:ext cx="0" cy="0"/>
-          <a:chOff x="0" y="0"/>
-          <a:chExt cx="0" cy="0"/>
-        </a:xfrm>
-      </p:grpSpPr>
-      <p:sp>
-        <p:nvSpPr>
-          <p:cNvPr id="2" name="Title 1"/>
-          <p:cNvSpPr>
-            <a:spLocks noGrp="1"/>
-          </p:cNvSpPr>
-          <p:nvPr>
-            <p:ph type="title"/>
-          </p:nvPr>
-        </p:nvSpPr>
-        <p:spPr/>
-        <p:txBody>
-          <a:bodyPr/>
-          <a:lstStyle/>
-          <a:p>
-            <a:pPr lvl="0" marL="0" indent="0">
-              <a:buNone/>
-            </a:pPr>
-            <a:r>
-              <a:rPr/>
-              <a:t>Gráfica</a:t>
-            </a:r>
-            <a:r>
-              <a:rPr/>
-              <a:t> </a:t>
-            </a:r>
-            <a:r>
-              <a:rPr/>
-              <a:t>de</a:t>
-            </a:r>
-            <a:r>
-              <a:rPr/>
-              <a:t> </a:t>
-            </a:r>
-            <a:r>
-              <a:rPr/>
-              <a:t>IMSS</a:t>
+              <a:t>Predicción</a:t>
             </a:r>
           </a:p>
         </p:txBody>
@@ -3717,83 +3635,6 @@
       <p:pic>
         <p:nvPicPr>
           <p:cNvPr descr="Presentación_files/figure-pptx/unnamed-chunk-11-1.png" id="0" name="Picture 1"/>
-          <p:cNvPicPr>
-            <a:picLocks noGrp="1" noChangeAspect="1"/>
-          </p:cNvPicPr>
-          <p:nvPr/>
-        </p:nvPicPr>
-        <p:blipFill>
-          <a:blip r:embed="rId2"/>
-          <a:stretch>
-            <a:fillRect/>
-          </a:stretch>
-        </p:blipFill>
-        <p:spPr bwMode="auto">
-          <a:xfrm>
-            <a:off x="1752600" y="1600200"/>
-            <a:ext cx="5651500" cy="4521200"/>
-          </a:xfrm>
-          <a:prstGeom prst="rect">
-            <a:avLst/>
-          </a:prstGeom>
-          <a:noFill/>
-          <a:ln w="9525">
-            <a:noFill/>
-            <a:headEnd/>
-            <a:tailEnd/>
-          </a:ln>
-        </p:spPr>
-      </p:pic>
-    </p:spTree>
-  </p:cSld>
-</p:sld>
-</file>
-
-<file path=ppt/slides/slide17.xml><?xml version="1.0" encoding="utf-8"?>
-<p:sld xmlns:a="http://schemas.openxmlformats.org/drawingml/2006/main" xmlns:r="http://schemas.openxmlformats.org/officeDocument/2006/relationships" xmlns:p="http://schemas.openxmlformats.org/presentationml/2006/main">
-  <p:cSld>
-    <p:spTree>
-      <p:nvGrpSpPr>
-        <p:cNvPr id="1" name=""/>
-        <p:cNvGrpSpPr/>
-        <p:nvPr/>
-      </p:nvGrpSpPr>
-      <p:grpSpPr>
-        <a:xfrm>
-          <a:off x="0" y="0"/>
-          <a:ext cx="0" cy="0"/>
-          <a:chOff x="0" y="0"/>
-          <a:chExt cx="0" cy="0"/>
-        </a:xfrm>
-      </p:grpSpPr>
-      <p:sp>
-        <p:nvSpPr>
-          <p:cNvPr id="2" name="Title 1"/>
-          <p:cNvSpPr>
-            <a:spLocks noGrp="1"/>
-          </p:cNvSpPr>
-          <p:nvPr>
-            <p:ph type="title"/>
-          </p:nvPr>
-        </p:nvSpPr>
-        <p:spPr/>
-        <p:txBody>
-          <a:bodyPr/>
-          <a:lstStyle/>
-          <a:p>
-            <a:pPr lvl="0" marL="0" indent="0">
-              <a:buNone/>
-            </a:pPr>
-            <a:r>
-              <a:rPr/>
-              <a:t>Predicción</a:t>
-            </a:r>
-          </a:p>
-        </p:txBody>
-      </p:sp>
-      <p:pic>
-        <p:nvPicPr>
-          <p:cNvPr descr="Presentación_files/figure-pptx/unnamed-chunk-12-1.png" id="0" name="Picture 1"/>
           <p:cNvPicPr>
             <a:picLocks noGrp="1" noChangeAspect="1"/>
           </p:cNvPicPr>
@@ -4015,14 +3856,46 @@
             </a:r>
             <a:r>
               <a:rPr/>
+              <a:t>de</a:t>
+            </a:r>
+            <a:r>
+              <a:rPr/>
+              <a:t> </a:t>
+            </a:r>
+            <a:r>
+              <a:rPr/>
               <a:t>PIB</a:t>
+            </a:r>
+            <a:r>
+              <a:rPr/>
+              <a:t> </a:t>
+            </a:r>
+            <a:r>
+              <a:rPr/>
+              <a:t>Estados</a:t>
+            </a:r>
+            <a:r>
+              <a:rPr/>
+              <a:t> </a:t>
+            </a:r>
+            <a:r>
+              <a:rPr/>
+              <a:t>más</a:t>
+            </a:r>
+            <a:r>
+              <a:rPr/>
+              <a:t> </a:t>
+            </a:r>
+            <a:r>
+              <a:rPr/>
+              <a:t>significativos</a:t>
             </a:r>
           </a:p>
         </p:txBody>
       </p:sp>
       <p:pic>
         <p:nvPicPr>
-          <p:cNvPr descr="figs/GIF_TEST2.gif" id="0" name="Picture 1"/>
+          <p:cNvPr descr="Presentación_files/figure-pptx/unnamed-chunk-2-1.png" id="0" name="Picture 1"/>
           <p:cNvPicPr>
             <a:picLocks noGrp="1" noChangeAspect="1"/>
           </p:cNvPicPr>
@@ -4036,8 +3909,8 @@
         </p:blipFill>
         <p:spPr bwMode="auto">
           <a:xfrm>
-            <a:off x="1320800" y="1600200"/>
-            <a:ext cx="6502400" cy="4013200"/>
+            <a:off x="1752600" y="1600200"/>
+            <a:ext cx="5651500" cy="4521200"/>
           </a:xfrm>
           <a:prstGeom prst="rect">
             <a:avLst/>
@@ -4050,44 +3923,6 @@
           </a:ln>
         </p:spPr>
       </p:pic>
-      <p:sp>
-        <p:nvSpPr>
-          <p:cNvPr id="1" name="TextBox 3"/>
-          <p:cNvSpPr txBox="1"/>
-          <p:nvPr/>
-        </p:nvSpPr>
-        <p:spPr>
-          <a:xfrm>
-            <a:off x="457200" y="5613400"/>
-            <a:ext cx="8229600" cy="508000"/>
-          </a:xfrm>
-          <a:prstGeom prst="rect">
-            <a:avLst/>
-          </a:prstGeom>
-          <a:noFill/>
-        </p:spPr>
-        <p:txBody>
-          <a:bodyPr/>
-          <a:lstStyle/>
-          <a:p>
-            <a:pPr lvl="0" marL="0" indent="0" algn="ctr">
-              <a:buNone/>
-            </a:pPr>
-            <a:r>
-              <a:rPr/>
-              <a:t>Gráfica</a:t>
-            </a:r>
-            <a:r>
-              <a:rPr/>
-              <a:t> </a:t>
-            </a:r>
-            <a:r>
-              <a:rPr/>
-              <a:t>PIB</a:t>
-            </a:r>
-          </a:p>
-        </p:txBody>
-      </p:sp>
     </p:spTree>
   </p:cSld>
 </p:sld>
@@ -4130,7 +3965,7 @@
             </a:pPr>
             <a:r>
               <a:rPr/>
-              <a:t>Gráfica</a:t>
+              <a:t>Ejemplo</a:t>
             </a:r>
             <a:r>
               <a:rPr/>
@@ -4138,7 +3973,7 @@
             </a:r>
             <a:r>
               <a:rPr/>
-              <a:t>de</a:t>
+              <a:t>predicción</a:t>
             </a:r>
             <a:r>
               <a:rPr/>
@@ -4146,14 +3981,30 @@
             </a:r>
             <a:r>
               <a:rPr/>
-              <a:t>PIB</a:t>
+              <a:t>con</a:t>
+            </a:r>
+            <a:r>
+              <a:rPr/>
+              <a:t> </a:t>
+            </a:r>
+            <a:r>
+              <a:rPr/>
+              <a:t>modelo</a:t>
+            </a:r>
+            <a:r>
+              <a:rPr/>
+              <a:t> </a:t>
+            </a:r>
+            <a:r>
+              <a:rPr/>
+              <a:t>ARIMA</a:t>
             </a:r>
           </a:p>
         </p:txBody>
       </p:sp>
       <p:pic>
         <p:nvPicPr>
-          <p:cNvPr descr="Presentación_files/figure-pptx/unnamed-chunk-2-1.png" id="0" name="Picture 1"/>
+          <p:cNvPr descr="Presentación_files/figure-pptx/unnamed-chunk-3-1.png" id="0" name="Picture 1"/>
           <p:cNvPicPr>
             <a:picLocks noGrp="1" noChangeAspect="1"/>
           </p:cNvPicPr>
@@ -4318,7 +4169,7 @@
       </p:sp>
       <p:pic>
         <p:nvPicPr>
-          <p:cNvPr descr="Presentación_files/figure-pptx/unnamed-chunk-4-1.png" id="0" name="Picture 1"/>
+          <p:cNvPr descr="Presentación_files/figure-pptx/unnamed-chunk-5-1.png" id="0" name="Picture 1"/>
           <p:cNvPicPr>
             <a:picLocks noGrp="1" noChangeAspect="1"/>
           </p:cNvPicPr>
@@ -4388,57 +4239,36 @@
             </a:pPr>
             <a:r>
               <a:rPr/>
-              <a:t>Comportamiento</a:t>
-            </a:r>
-            <a:r>
-              <a:rPr/>
-              <a:t> </a:t>
-            </a:r>
-            <a:r>
-              <a:rPr/>
-              <a:t>de</a:t>
-            </a:r>
-            <a:r>
-              <a:rPr/>
-              <a:t> </a:t>
-            </a:r>
-            <a:r>
-              <a:rPr/>
-              <a:t>visitantes</a:t>
-            </a:r>
-          </a:p>
-        </p:txBody>
-      </p:sp>
-      <p:pic>
-        <p:nvPicPr>
-          <p:cNvPr descr="Presentación_files/figure-pptx/unnamed-chunk-5-1.png" id="0" name="Picture 1"/>
-          <p:cNvPicPr>
-            <a:picLocks noGrp="1" noChangeAspect="1"/>
-          </p:cNvPicPr>
-          <p:nvPr/>
-        </p:nvPicPr>
-        <p:blipFill>
-          <a:blip r:embed="rId2"/>
-          <a:stretch>
-            <a:fillRect/>
-          </a:stretch>
-        </p:blipFill>
-        <p:spPr bwMode="auto">
-          <a:xfrm>
-            <a:off x="1752600" y="1600200"/>
-            <a:ext cx="5651500" cy="4521200"/>
-          </a:xfrm>
-          <a:prstGeom prst="rect">
-            <a:avLst/>
-          </a:prstGeom>
-          <a:noFill/>
-          <a:ln w="9525">
-            <a:noFill/>
-            <a:headEnd/>
-            <a:tailEnd/>
-          </a:ln>
-        </p:spPr>
-      </p:pic>
+              <a:t>INPC</a:t>
+            </a:r>
+          </a:p>
+        </p:txBody>
+      </p:sp>
+      <p:sp>
+        <p:nvSpPr>
+          <p:cNvPr id="3" name="Content Placeholder 2"/>
+          <p:cNvSpPr>
+            <a:spLocks noGrp="1"/>
+          </p:cNvSpPr>
+          <p:nvPr>
+            <p:ph idx="1"/>
+          </p:nvPr>
+        </p:nvSpPr>
+        <p:spPr/>
+        <p:txBody>
+          <a:bodyPr/>
+          <a:lstStyle/>
+          <a:p>
+            <a:pPr lvl="0" marL="0" indent="0">
+              <a:buNone/>
+            </a:pPr>
+            <a:r>
+              <a:rPr/>
+              <a:t>Vamos a analizar el INPC (Indice Nacional de Precios al Consumidor). Primero hay que definir que es el índice de precios al consumidor o índice de precios de consumo(comúnmente llamado por su sigla IPC) ; es un índice económico en el que se valoran los precios de un determinado conjunto de bienes y servicios.</a:t>
+            </a:r>
+          </a:p>
+        </p:txBody>
+      </p:sp>
     </p:spTree>
   </p:cSld>
 </p:sld>
@@ -4481,14 +4311,22 @@
             </a:pPr>
             <a:r>
               <a:rPr/>
-              <a:t>Predicción</a:t>
+              <a:t>Gráficas</a:t>
+            </a:r>
+            <a:r>
+              <a:rPr/>
+              <a:t> </a:t>
+            </a:r>
+            <a:r>
+              <a:rPr/>
+              <a:t>INPC</a:t>
             </a:r>
           </a:p>
         </p:txBody>
       </p:sp>
       <p:pic>
         <p:nvPicPr>
-          <p:cNvPr descr="Presentación_files/figure-pptx/unnamed-chunk-6-1.png" id="0" name="Picture 1"/>
+          <p:cNvPr descr="Presentación_files/figure-pptx/unnamed-chunk-8-1.png" id="0" name="Picture 1"/>
           <p:cNvPicPr>
             <a:picLocks noGrp="1" noChangeAspect="1"/>
           </p:cNvPicPr>

</xml_diff>